<commit_message>
requirements and presentation changes
</commit_message>
<xml_diff>
--- a/presentation/UK Embedded Solar Generation.pptx
+++ b/presentation/UK Embedded Solar Generation.pptx
@@ -14406,7 +14406,7 @@
             </a:br>
             <a:r>
               <a:rPr lang="en-US" sz="1200" dirty="0"/>
-              <a:t>The UK national electricity grid network was originally designed in the 1950s for transporting electricity from traditional large scale base-load turbine generators connected to the transmission network (132kV and above) which subsequently supply the distribution network (132kV and below) to then feed our homes and businesses.</a:t>
+              <a:t>The UK national electricity grid network was originally designed in the 1950s for transporting electricity from traditional large-scale base-load turbine generators connected to the transmission network (132kV and above) which subsequently supply the distribution network (132kV and below) to then feed our homes and businesses.</a:t>
             </a:r>
           </a:p>
           <a:p>
@@ -14415,7 +14415,7 @@
             </a:pPr>
             <a:r>
               <a:rPr lang="en-US" sz="1200" dirty="0"/>
-              <a:t>Solar and battery power plants tend to be much smaller than traditional turbines meaning they are connected at lower voltages directly to the distribution networks (132kV and below – i.e., embedded Generation):</a:t>
+              <a:t>Solar and battery power plants tend to be much smaller than traditional turbine generators meaning they are connected at lower voltages directly to the distribution networks (132kV and below – i.e., embedded Generation):</a:t>
             </a:r>
           </a:p>
           <a:p>

</xml_diff>

<commit_message>
First commit new repo
</commit_message>
<xml_diff>
--- a/presentation/UK Embedded Solar Generation.pptx
+++ b/presentation/UK Embedded Solar Generation.pptx
@@ -12,16 +12,16 @@
   </p:handoutMasterIdLst>
   <p:sldIdLst>
     <p:sldId id="256" r:id="rId5"/>
-    <p:sldId id="262" r:id="rId6"/>
-    <p:sldId id="258" r:id="rId7"/>
-    <p:sldId id="265" r:id="rId8"/>
-    <p:sldId id="263" r:id="rId9"/>
-    <p:sldId id="270" r:id="rId10"/>
-    <p:sldId id="271" r:id="rId11"/>
-    <p:sldId id="264" r:id="rId12"/>
-    <p:sldId id="266" r:id="rId13"/>
-    <p:sldId id="259" r:id="rId14"/>
-    <p:sldId id="261" r:id="rId15"/>
+    <p:sldId id="266" r:id="rId6"/>
+    <p:sldId id="262" r:id="rId7"/>
+    <p:sldId id="258" r:id="rId8"/>
+    <p:sldId id="265" r:id="rId9"/>
+    <p:sldId id="263" r:id="rId10"/>
+    <p:sldId id="264" r:id="rId11"/>
+    <p:sldId id="259" r:id="rId12"/>
+    <p:sldId id="261" r:id="rId13"/>
+    <p:sldId id="270" r:id="rId14"/>
+    <p:sldId id="271" r:id="rId15"/>
     <p:sldId id="267" r:id="rId16"/>
     <p:sldId id="268" r:id="rId17"/>
     <p:sldId id="269" r:id="rId18"/>
@@ -6124,7 +6124,7 @@
           <a:p>
             <a:fld id="{AF869721-F543-4A6C-BF9D-65D7CC540427}" type="datetimeFigureOut">
               <a:rPr lang="en-US" smtClean="0"/>
-              <a:t>1/25/2026</a:t>
+              <a:t>1/27/2026</a:t>
             </a:fld>
             <a:endParaRPr lang="en-US" dirty="0"/>
           </a:p>
@@ -6301,7 +6301,7 @@
           <a:p>
             <a:fld id="{C732326A-4C88-4AFB-AA5B-5919D81DFF5B}" type="datetimeFigureOut">
               <a:rPr lang="en-US" smtClean="0"/>
-              <a:t>1/25/2026</a:t>
+              <a:t>1/27/2026</a:t>
             </a:fld>
             <a:endParaRPr lang="en-US" dirty="0"/>
           </a:p>
@@ -6721,7 +6721,7 @@
           <a:p>
             <a:fld id="{C6B3AB32-59DF-41F1-9618-EDFBF5049629}" type="slidenum">
               <a:rPr lang="en-US" smtClean="0"/>
-              <a:t>8</a:t>
+              <a:t>7</a:t>
             </a:fld>
             <a:endParaRPr lang="en-US" dirty="0"/>
           </a:p>
@@ -6805,7 +6805,7 @@
           <a:p>
             <a:fld id="{C6B3AB32-59DF-41F1-9618-EDFBF5049629}" type="slidenum">
               <a:rPr lang="en-US" smtClean="0"/>
-              <a:t>10</a:t>
+              <a:t>8</a:t>
             </a:fld>
             <a:endParaRPr lang="en-US" dirty="0"/>
           </a:p>
@@ -6889,7 +6889,7 @@
           <a:p>
             <a:fld id="{C6B3AB32-59DF-41F1-9618-EDFBF5049629}" type="slidenum">
               <a:rPr lang="en-US" smtClean="0"/>
-              <a:t>11</a:t>
+              <a:t>9</a:t>
             </a:fld>
             <a:endParaRPr lang="en-US" dirty="0"/>
           </a:p>
@@ -7196,7 +7196,7 @@
             <a:fld id="{B61BEF0D-F0BB-DE4B-95CE-6DB70DBA9567}" type="datetimeFigureOut">
               <a:rPr lang="en-US" smtClean="0"/>
               <a:pPr/>
-              <a:t>1/25/2026</a:t>
+              <a:t>1/27/2026</a:t>
             </a:fld>
             <a:endParaRPr lang="en-US" dirty="0"/>
           </a:p>
@@ -7429,7 +7429,7 @@
             <a:fld id="{B61BEF0D-F0BB-DE4B-95CE-6DB70DBA9567}" type="datetimeFigureOut">
               <a:rPr lang="en-US" smtClean="0"/>
               <a:pPr/>
-              <a:t>1/25/2026</a:t>
+              <a:t>1/27/2026</a:t>
             </a:fld>
             <a:endParaRPr lang="en-US" dirty="0"/>
           </a:p>
@@ -7611,7 +7611,7 @@
             <a:fld id="{B61BEF0D-F0BB-DE4B-95CE-6DB70DBA9567}" type="datetimeFigureOut">
               <a:rPr lang="en-US" smtClean="0"/>
               <a:pPr/>
-              <a:t>1/25/2026</a:t>
+              <a:t>1/27/2026</a:t>
             </a:fld>
             <a:endParaRPr lang="en-US" dirty="0"/>
           </a:p>
@@ -7783,7 +7783,7 @@
             <a:fld id="{B61BEF0D-F0BB-DE4B-95CE-6DB70DBA9567}" type="datetimeFigureOut">
               <a:rPr lang="en-US" smtClean="0"/>
               <a:pPr/>
-              <a:t>1/25/2026</a:t>
+              <a:t>1/27/2026</a:t>
             </a:fld>
             <a:endParaRPr lang="en-US" dirty="0"/>
           </a:p>
@@ -8076,7 +8076,7 @@
             <a:fld id="{B61BEF0D-F0BB-DE4B-95CE-6DB70DBA9567}" type="datetimeFigureOut">
               <a:rPr lang="en-US" smtClean="0"/>
               <a:pPr/>
-              <a:t>1/25/2026</a:t>
+              <a:t>1/27/2026</a:t>
             </a:fld>
             <a:endParaRPr lang="en-US" dirty="0"/>
           </a:p>
@@ -8404,7 +8404,7 @@
             <a:fld id="{B61BEF0D-F0BB-DE4B-95CE-6DB70DBA9567}" type="datetimeFigureOut">
               <a:rPr lang="en-US" smtClean="0"/>
               <a:pPr/>
-              <a:t>1/25/2026</a:t>
+              <a:t>1/27/2026</a:t>
             </a:fld>
             <a:endParaRPr lang="en-US" dirty="0"/>
           </a:p>
@@ -8818,7 +8818,7 @@
             <a:fld id="{B61BEF0D-F0BB-DE4B-95CE-6DB70DBA9567}" type="datetimeFigureOut">
               <a:rPr lang="en-US" smtClean="0"/>
               <a:pPr/>
-              <a:t>1/25/2026</a:t>
+              <a:t>1/27/2026</a:t>
             </a:fld>
             <a:endParaRPr lang="en-US" dirty="0"/>
           </a:p>
@@ -8938,7 +8938,7 @@
             <a:fld id="{B61BEF0D-F0BB-DE4B-95CE-6DB70DBA9567}" type="datetimeFigureOut">
               <a:rPr lang="en-US" smtClean="0"/>
               <a:pPr/>
-              <a:t>1/25/2026</a:t>
+              <a:t>1/27/2026</a:t>
             </a:fld>
             <a:endParaRPr lang="en-US" dirty="0"/>
           </a:p>
@@ -9035,7 +9035,7 @@
             <a:fld id="{B61BEF0D-F0BB-DE4B-95CE-6DB70DBA9567}" type="datetimeFigureOut">
               <a:rPr lang="en-US" smtClean="0"/>
               <a:pPr/>
-              <a:t>1/25/2026</a:t>
+              <a:t>1/27/2026</a:t>
             </a:fld>
             <a:endParaRPr lang="en-US" dirty="0"/>
           </a:p>
@@ -9324,7 +9324,7 @@
             <a:fld id="{B61BEF0D-F0BB-DE4B-95CE-6DB70DBA9567}" type="datetimeFigureOut">
               <a:rPr lang="en-US" smtClean="0"/>
               <a:pPr/>
-              <a:t>1/25/2026</a:t>
+              <a:t>1/27/2026</a:t>
             </a:fld>
             <a:endParaRPr lang="en-US" dirty="0"/>
           </a:p>
@@ -9603,7 +9603,7 @@
             <a:fld id="{B61BEF0D-F0BB-DE4B-95CE-6DB70DBA9567}" type="datetimeFigureOut">
               <a:rPr lang="en-US" smtClean="0"/>
               <a:pPr/>
-              <a:t>1/25/2026</a:t>
+              <a:t>1/27/2026</a:t>
             </a:fld>
             <a:endParaRPr lang="en-US" dirty="0"/>
           </a:p>
@@ -9863,7 +9863,7 @@
             <a:fld id="{B61BEF0D-F0BB-DE4B-95CE-6DB70DBA9567}" type="datetimeFigureOut">
               <a:rPr lang="en-US" smtClean="0"/>
               <a:pPr/>
-              <a:t>1/25/2026</a:t>
+              <a:t>1/27/2026</a:t>
             </a:fld>
             <a:endParaRPr lang="en-US" dirty="0"/>
           </a:p>
@@ -10768,150 +10768,6 @@
 <file path=ppt/slides/slide10.xml><?xml version="1.0" encoding="utf-8"?>
 <p:sld xmlns:a="http://schemas.openxmlformats.org/drawingml/2006/main" xmlns:r="http://schemas.openxmlformats.org/officeDocument/2006/relationships" xmlns:p="http://schemas.openxmlformats.org/presentationml/2006/main">
   <p:cSld>
-    <p:bg>
-      <p:bgPr>
-        <a:solidFill>
-          <a:schemeClr val="bg1"/>
-        </a:solidFill>
-        <a:effectLst/>
-      </p:bgPr>
-    </p:bg>
-    <p:spTree>
-      <p:nvGrpSpPr>
-        <p:cNvPr id="1" name=""/>
-        <p:cNvGrpSpPr/>
-        <p:nvPr/>
-      </p:nvGrpSpPr>
-      <p:grpSpPr>
-        <a:xfrm>
-          <a:off x="0" y="0"/>
-          <a:ext cx="0" cy="0"/>
-          <a:chOff x="0" y="0"/>
-          <a:chExt cx="0" cy="0"/>
-        </a:xfrm>
-      </p:grpSpPr>
-      <p:pic>
-        <p:nvPicPr>
-          <p:cNvPr id="8" name="Content Placeholder 4" descr="Digital Numbers">
-            <a:extLst>
-              <a:ext uri="{FF2B5EF4-FFF2-40B4-BE49-F238E27FC236}">
-                <a16:creationId xmlns:a16="http://schemas.microsoft.com/office/drawing/2014/main" id="{EA70616B-E344-4856-8DF9-707C26236613}"/>
-              </a:ext>
-            </a:extLst>
-          </p:cNvPr>
-          <p:cNvPicPr>
-            <a:picLocks noChangeAspect="1"/>
-          </p:cNvPicPr>
-          <p:nvPr/>
-        </p:nvPicPr>
-        <p:blipFill rotWithShape="1">
-          <a:blip r:embed="rId3" cstate="screen">
-            <a:extLst>
-              <a:ext uri="{28A0092B-C50C-407E-A947-70E740481C1C}">
-                <a14:useLocalDpi xmlns:a14="http://schemas.microsoft.com/office/drawing/2010/main"/>
-              </a:ext>
-            </a:extLst>
-          </a:blip>
-          <a:srcRect t="10681" r="9091" b="12711"/>
-          <a:stretch/>
-        </p:blipFill>
-        <p:spPr>
-          <a:xfrm>
-            <a:off x="20" y="0"/>
-            <a:ext cx="12191980" cy="6857990"/>
-          </a:xfrm>
-          <a:prstGeom prst="rect">
-            <a:avLst/>
-          </a:prstGeom>
-        </p:spPr>
-      </p:pic>
-      <p:graphicFrame>
-        <p:nvGraphicFramePr>
-          <p:cNvPr id="12" name="Diagram 11">
-            <a:extLst>
-              <a:ext uri="{FF2B5EF4-FFF2-40B4-BE49-F238E27FC236}">
-                <a16:creationId xmlns:a16="http://schemas.microsoft.com/office/drawing/2014/main" id="{C538149B-35A8-3FDD-F655-69C12E0CAC46}"/>
-              </a:ext>
-            </a:extLst>
-          </p:cNvPr>
-          <p:cNvGraphicFramePr/>
-          <p:nvPr>
-            <p:extLst>
-              <p:ext uri="{D42A27DB-BD31-4B8C-83A1-F6EECF244321}">
-                <p14:modId xmlns:p14="http://schemas.microsoft.com/office/powerpoint/2010/main" val="352904196"/>
-              </p:ext>
-            </p:extLst>
-          </p:nvPr>
-        </p:nvGraphicFramePr>
-        <p:xfrm>
-          <a:off x="3013067" y="580193"/>
-          <a:ext cx="10456605" cy="5697603"/>
-        </p:xfrm>
-        <a:graphic>
-          <a:graphicData uri="http://schemas.openxmlformats.org/drawingml/2006/diagram">
-            <dgm:relIds xmlns:dgm="http://schemas.openxmlformats.org/drawingml/2006/diagram" xmlns:r="http://schemas.openxmlformats.org/officeDocument/2006/relationships" r:dm="rId4" r:lo="rId5" r:qs="rId6" r:cs="rId7"/>
-          </a:graphicData>
-        </a:graphic>
-      </p:graphicFrame>
-      <p:sp>
-        <p:nvSpPr>
-          <p:cNvPr id="13" name="Title 1">
-            <a:extLst>
-              <a:ext uri="{FF2B5EF4-FFF2-40B4-BE49-F238E27FC236}">
-                <a16:creationId xmlns:a16="http://schemas.microsoft.com/office/drawing/2014/main" id="{BC34CB4B-464D-826E-C399-E06977B0DA98}"/>
-              </a:ext>
-            </a:extLst>
-          </p:cNvPr>
-          <p:cNvSpPr>
-            <a:spLocks noGrp="1"/>
-          </p:cNvSpPr>
-          <p:nvPr>
-            <p:ph type="title"/>
-          </p:nvPr>
-        </p:nvSpPr>
-        <p:spPr>
-          <a:xfrm>
-            <a:off x="1356350" y="580193"/>
-            <a:ext cx="5344334" cy="880182"/>
-          </a:xfrm>
-        </p:spPr>
-        <p:txBody>
-          <a:bodyPr vert="horz" lIns="91440" tIns="45720" rIns="91440" bIns="45720" rtlCol="0" anchor="b">
-            <a:normAutofit/>
-          </a:bodyPr>
-          <a:lstStyle/>
-          <a:p>
-            <a:r>
-              <a:rPr lang="en-US" dirty="0"/>
-              <a:t>2.0 The Dashboard</a:t>
-            </a:r>
-          </a:p>
-        </p:txBody>
-      </p:sp>
-    </p:spTree>
-    <p:extLst>
-      <p:ext uri="{BB962C8B-B14F-4D97-AF65-F5344CB8AC3E}">
-        <p14:creationId xmlns:p14="http://schemas.microsoft.com/office/powerpoint/2010/main" val="4209322005"/>
-      </p:ext>
-    </p:extLst>
-  </p:cSld>
-  <p:clrMapOvr>
-    <a:masterClrMapping/>
-  </p:clrMapOvr>
-</p:sld>
-</file>
-
-<file path=ppt/slides/slide11.xml><?xml version="1.0" encoding="utf-8"?>
-<p:sld xmlns:a="http://schemas.openxmlformats.org/drawingml/2006/main" xmlns:r="http://schemas.openxmlformats.org/officeDocument/2006/relationships" xmlns:p="http://schemas.openxmlformats.org/presentationml/2006/main">
-  <p:cSld>
-    <p:bg>
-      <p:bgPr>
-        <a:solidFill>
-          <a:schemeClr val="bg1"/>
-        </a:solidFill>
-        <a:effectLst/>
-      </p:bgPr>
-    </p:bg>
     <p:spTree>
       <p:nvGrpSpPr>
         <p:cNvPr id="1" name=""/>
@@ -10931,7 +10787,7 @@
           <p:cNvPr id="2" name="Title 1">
             <a:extLst>
               <a:ext uri="{FF2B5EF4-FFF2-40B4-BE49-F238E27FC236}">
-                <a16:creationId xmlns:a16="http://schemas.microsoft.com/office/drawing/2014/main" id="{5B040558-A365-4CCE-92FA-5A48CD98F9C9}"/>
+                <a16:creationId xmlns:a16="http://schemas.microsoft.com/office/drawing/2014/main" id="{2440D2A0-EA5E-1D9B-7EC9-9AC800D4C0E1}"/>
               </a:ext>
             </a:extLst>
           </p:cNvPr>
@@ -10944,64 +10800,57 @@
         </p:nvSpPr>
         <p:spPr>
           <a:xfrm>
-            <a:off x="658260" y="586994"/>
-            <a:ext cx="3489363" cy="718870"/>
+            <a:off x="450711" y="199575"/>
+            <a:ext cx="9692640" cy="773819"/>
           </a:xfrm>
         </p:spPr>
         <p:txBody>
-          <a:bodyPr>
-            <a:normAutofit fontScale="90000"/>
-          </a:bodyPr>
+          <a:bodyPr/>
           <a:lstStyle/>
           <a:p>
             <a:r>
-              <a:rPr lang="en-US" dirty="0">
-                <a:solidFill>
-                  <a:srgbClr val="FFFEFF"/>
-                </a:solidFill>
-              </a:rPr>
-              <a:t>2.1 Data Flow</a:t>
+              <a:rPr lang="en-GB" dirty="0"/>
+              <a:t>2.2 GSP Embedded Solar Capacity</a:t>
             </a:r>
           </a:p>
         </p:txBody>
       </p:sp>
-      <p:graphicFrame>
-        <p:nvGraphicFramePr>
-          <p:cNvPr id="4" name="Content Placeholder 3" descr="icon SmartArt graphic">
+      <p:pic>
+        <p:nvPicPr>
+          <p:cNvPr id="6" name="Picture 5">
             <a:extLst>
               <a:ext uri="{FF2B5EF4-FFF2-40B4-BE49-F238E27FC236}">
-                <a16:creationId xmlns:a16="http://schemas.microsoft.com/office/drawing/2014/main" id="{81E592E1-99DF-4294-A2E9-EF46299BD3F4}"/>
+                <a16:creationId xmlns:a16="http://schemas.microsoft.com/office/drawing/2014/main" id="{05C0D5EA-4B12-9E75-C267-2787F569D617}"/>
               </a:ext>
             </a:extLst>
           </p:cNvPr>
-          <p:cNvGraphicFramePr>
-            <a:graphicFrameLocks noGrp="1"/>
-          </p:cNvGraphicFramePr>
-          <p:nvPr>
-            <p:ph idx="1"/>
-            <p:extLst>
-              <p:ext uri="{D42A27DB-BD31-4B8C-83A1-F6EECF244321}">
-                <p14:modId xmlns:p14="http://schemas.microsoft.com/office/powerpoint/2010/main" val="392105732"/>
-              </p:ext>
-            </p:extLst>
-          </p:nvPr>
-        </p:nvGraphicFramePr>
-        <p:xfrm>
-          <a:off x="3116578" y="384722"/>
-          <a:ext cx="9075422" cy="1842285"/>
-        </p:xfrm>
-        <a:graphic>
-          <a:graphicData uri="http://schemas.openxmlformats.org/drawingml/2006/diagram">
-            <dgm:relIds xmlns:dgm="http://schemas.openxmlformats.org/drawingml/2006/diagram" xmlns:r="http://schemas.openxmlformats.org/officeDocument/2006/relationships" r:dm="rId3" r:lo="rId4" r:qs="rId5" r:cs="rId6"/>
-          </a:graphicData>
-        </a:graphic>
-      </p:graphicFrame>
+          <p:cNvPicPr>
+            <a:picLocks noChangeAspect="1"/>
+          </p:cNvPicPr>
+          <p:nvPr/>
+        </p:nvPicPr>
+        <p:blipFill>
+          <a:blip r:embed="rId2"/>
+          <a:stretch>
+            <a:fillRect/>
+          </a:stretch>
+        </p:blipFill>
+        <p:spPr>
+          <a:xfrm>
+            <a:off x="3944456" y="973394"/>
+            <a:ext cx="7161080" cy="5523564"/>
+          </a:xfrm>
+          <a:prstGeom prst="rect">
+            <a:avLst/>
+          </a:prstGeom>
+        </p:spPr>
+      </p:pic>
       <p:sp>
         <p:nvSpPr>
-          <p:cNvPr id="3" name="TextBox 2">
+          <p:cNvPr id="8" name="TextBox 7">
             <a:extLst>
               <a:ext uri="{FF2B5EF4-FFF2-40B4-BE49-F238E27FC236}">
-                <a16:creationId xmlns:a16="http://schemas.microsoft.com/office/drawing/2014/main" id="{6E5A29A0-4DB8-CD3B-6F67-070DC0A0738F}"/>
+                <a16:creationId xmlns:a16="http://schemas.microsoft.com/office/drawing/2014/main" id="{2D3A1E08-1FA9-6E6C-873F-BE4C9C0D8394}"/>
               </a:ext>
             </a:extLst>
           </p:cNvPr>
@@ -11010,150 +10859,251 @@
         </p:nvSpPr>
         <p:spPr>
           <a:xfrm>
-            <a:off x="761499" y="2612988"/>
-            <a:ext cx="10004824" cy="3693319"/>
+            <a:off x="450711" y="1196019"/>
+            <a:ext cx="3493745" cy="4770537"/>
           </a:xfrm>
           <a:prstGeom prst="rect">
             <a:avLst/>
           </a:prstGeom>
-          <a:solidFill>
-            <a:schemeClr val="bg1"/>
-          </a:solidFill>
+          <a:noFill/>
         </p:spPr>
         <p:txBody>
-          <a:bodyPr wrap="square" rtlCol="0">
+          <a:bodyPr wrap="square">
             <a:spAutoFit/>
           </a:bodyPr>
           <a:lstStyle/>
           <a:p>
-            <a:r>
-              <a:rPr lang="en-GB" dirty="0"/>
-              <a:t>The dashboard connects to two endpoints from the </a:t>
-            </a:r>
-            <a:r>
-              <a:rPr lang="en-GB" dirty="0">
-                <a:hlinkClick r:id="rId8"/>
+            <a:pPr algn="l">
+              <a:buNone/>
+            </a:pPr>
+            <a:r>
+              <a:rPr lang="en-GB" sz="1600" b="1" i="0" dirty="0">
+                <a:solidFill>
+                  <a:srgbClr val="FAFAFA"/>
+                </a:solidFill>
+                <a:effectLst/>
               </a:rPr>
-              <a:t>Sheffield Solar </a:t>
-            </a:r>
-            <a:r>
-              <a:rPr lang="en-GB" dirty="0" err="1">
-                <a:hlinkClick r:id="rId8"/>
+              <a:t>UK Embedded Solar Capacity Over Time:</a:t>
+            </a:r>
+          </a:p>
+          <a:p>
+            <a:pPr algn="l">
+              <a:buNone/>
+            </a:pPr>
+            <a:endParaRPr lang="en-GB" sz="1600" b="0" i="0" dirty="0">
+              <a:solidFill>
+                <a:srgbClr val="FAFAFA"/>
+              </a:solidFill>
+              <a:effectLst/>
+            </a:endParaRPr>
+          </a:p>
+          <a:p>
+            <a:pPr algn="l">
+              <a:buNone/>
+            </a:pPr>
+            <a:r>
+              <a:rPr lang="en-GB" sz="1600" b="0" i="0" dirty="0">
+                <a:solidFill>
+                  <a:srgbClr val="FAFAFA"/>
+                </a:solidFill>
+                <a:effectLst/>
               </a:rPr>
-              <a:t>PVLive</a:t>
-            </a:r>
-            <a:r>
-              <a:rPr lang="en-GB" dirty="0">
-                <a:hlinkClick r:id="rId8"/>
+              <a:t>Significant growth of solar capacity over the past 15 years was driven initially by the Feed-in-Tariff (FiT) subsidy scheme from 2010 to 2015 with later growth marked by the reducing cost of building and maintaining solar, making it now one of the cheapest forms of producing electricity. </a:t>
+            </a:r>
+          </a:p>
+          <a:p>
+            <a:pPr algn="l">
+              <a:buNone/>
+            </a:pPr>
+            <a:endParaRPr lang="en-GB" sz="1600" dirty="0">
+              <a:solidFill>
+                <a:srgbClr val="FAFAFA"/>
+              </a:solidFill>
+            </a:endParaRPr>
+          </a:p>
+          <a:p>
+            <a:pPr algn="l">
+              <a:buNone/>
+            </a:pPr>
+            <a:r>
+              <a:rPr lang="en-GB" sz="1600" b="0" i="0" dirty="0">
+                <a:solidFill>
+                  <a:srgbClr val="FAFAFA"/>
+                </a:solidFill>
+                <a:effectLst/>
               </a:rPr>
-              <a:t> API </a:t>
-            </a:r>
-            <a:r>
-              <a:rPr lang="en-GB" dirty="0"/>
-              <a:t>to extract:</a:t>
-            </a:r>
-          </a:p>
-          <a:p>
-            <a:endParaRPr lang="en-GB" dirty="0"/>
-          </a:p>
-          <a:p>
-            <a:pPr marL="342900" indent="-342900">
-              <a:buFont typeface="+mj-lt"/>
-              <a:buAutoNum type="arabicPeriod"/>
-            </a:pPr>
-            <a:r>
-              <a:rPr lang="en-GB" dirty="0"/>
-              <a:t>Cumulative solar capacity (MWp), and;</a:t>
-            </a:r>
-          </a:p>
-          <a:p>
-            <a:pPr marL="342900" indent="-342900">
-              <a:buFont typeface="+mj-lt"/>
-              <a:buAutoNum type="arabicPeriod"/>
-            </a:pPr>
-            <a:r>
-              <a:rPr lang="en-GB" dirty="0"/>
-              <a:t>Historic solar generation (MWh).</a:t>
-            </a:r>
-          </a:p>
-          <a:p>
-            <a:endParaRPr lang="en-GB" dirty="0"/>
-          </a:p>
-          <a:p>
-            <a:r>
-              <a:rPr lang="en-GB" dirty="0"/>
-              <a:t>It then matches GSP IDs to their geo-locations sourced from the:</a:t>
-            </a:r>
-            <a:endParaRPr lang="en-GB" dirty="0">
-              <a:hlinkClick r:id="rId9"/>
-            </a:endParaRPr>
-          </a:p>
-          <a:p>
-            <a:pPr marL="285750" indent="-285750">
-              <a:buFont typeface="Arial" panose="020B0604020202020204" pitchFamily="34" charset="0"/>
-              <a:buChar char="•"/>
-            </a:pPr>
-            <a:r>
-              <a:rPr lang="en-GB" dirty="0">
-                <a:hlinkClick r:id="rId9"/>
-              </a:rPr>
-              <a:t>NESOs website</a:t>
-            </a:r>
-            <a:r>
-              <a:rPr lang="en-GB" dirty="0"/>
-              <a:t>,</a:t>
-            </a:r>
-          </a:p>
-          <a:p>
-            <a:r>
-              <a:rPr lang="en-GB" dirty="0"/>
-              <a:t>and (using the location of the selected GSP) pulls localised historic hourly weather data from:</a:t>
-            </a:r>
-          </a:p>
-          <a:p>
-            <a:pPr marL="285750" indent="-285750">
-              <a:buFont typeface="Arial" panose="020B0604020202020204" pitchFamily="34" charset="0"/>
-              <a:buChar char="•"/>
-            </a:pPr>
-            <a:r>
-              <a:rPr lang="en-GB" dirty="0">
-                <a:hlinkClick r:id="rId10"/>
-              </a:rPr>
-              <a:t>Open </a:t>
-            </a:r>
-            <a:r>
-              <a:rPr lang="en-GB" dirty="0" err="1">
-                <a:hlinkClick r:id="rId10"/>
-              </a:rPr>
-              <a:t>meteo</a:t>
-            </a:r>
-            <a:r>
-              <a:rPr lang="en-GB" dirty="0">
-                <a:hlinkClick r:id="rId10"/>
-              </a:rPr>
-              <a:t> historical weather</a:t>
-            </a:r>
-            <a:endParaRPr lang="en-GB" dirty="0"/>
-          </a:p>
-          <a:p>
-            <a:r>
-              <a:rPr lang="en-GB" dirty="0"/>
-              <a:t>then trains, fits and predicts with a machine learning model based on selected solar and weather data profiles.</a:t>
-            </a:r>
-          </a:p>
-          <a:p>
-            <a:pPr marL="285750" indent="-285750">
-              <a:buFont typeface="Arial" panose="020B0604020202020204" pitchFamily="34" charset="0"/>
-              <a:buChar char="•"/>
-            </a:pPr>
-            <a:endParaRPr lang="en-GB" dirty="0"/>
+              <a:t>The latest challenge faced by the industry is now caused by an over-congested UK electricity grid network. Particularly for larger installations which are struggling to find capacity on the network.</a:t>
+            </a:r>
           </a:p>
         </p:txBody>
       </p:sp>
     </p:spTree>
     <p:extLst>
       <p:ext uri="{BB962C8B-B14F-4D97-AF65-F5344CB8AC3E}">
-        <p14:creationId xmlns:p14="http://schemas.microsoft.com/office/powerpoint/2010/main" val="1703342593"/>
+        <p14:creationId xmlns:p14="http://schemas.microsoft.com/office/powerpoint/2010/main" val="291884891"/>
+      </p:ext>
+    </p:extLst>
+  </p:cSld>
+  <p:clrMapOvr>
+    <a:masterClrMapping/>
+  </p:clrMapOvr>
+</p:sld>
+</file>
+
+<file path=ppt/slides/slide11.xml><?xml version="1.0" encoding="utf-8"?>
+<p:sld xmlns:a="http://schemas.openxmlformats.org/drawingml/2006/main" xmlns:r="http://schemas.openxmlformats.org/officeDocument/2006/relationships" xmlns:p="http://schemas.openxmlformats.org/presentationml/2006/main">
+  <p:cSld>
+    <p:spTree>
+      <p:nvGrpSpPr>
+        <p:cNvPr id="1" name=""/>
+        <p:cNvGrpSpPr/>
+        <p:nvPr/>
+      </p:nvGrpSpPr>
+      <p:grpSpPr>
+        <a:xfrm>
+          <a:off x="0" y="0"/>
+          <a:ext cx="0" cy="0"/>
+          <a:chOff x="0" y="0"/>
+          <a:chExt cx="0" cy="0"/>
+        </a:xfrm>
+      </p:grpSpPr>
+      <p:pic>
+        <p:nvPicPr>
+          <p:cNvPr id="4" name="Picture 3">
+            <a:extLst>
+              <a:ext uri="{FF2B5EF4-FFF2-40B4-BE49-F238E27FC236}">
+                <a16:creationId xmlns:a16="http://schemas.microsoft.com/office/drawing/2014/main" id="{AB34F1EE-A363-BBFC-549A-21F029F967E9}"/>
+              </a:ext>
+            </a:extLst>
+          </p:cNvPr>
+          <p:cNvPicPr>
+            <a:picLocks noChangeAspect="1"/>
+          </p:cNvPicPr>
+          <p:nvPr/>
+        </p:nvPicPr>
+        <p:blipFill>
+          <a:blip r:embed="rId2"/>
+          <a:stretch>
+            <a:fillRect/>
+          </a:stretch>
+        </p:blipFill>
+        <p:spPr>
+          <a:xfrm>
+            <a:off x="4129548" y="1212986"/>
+            <a:ext cx="7092404" cy="4747670"/>
+          </a:xfrm>
+          <a:prstGeom prst="rect">
+            <a:avLst/>
+          </a:prstGeom>
+        </p:spPr>
+      </p:pic>
+      <p:sp>
+        <p:nvSpPr>
+          <p:cNvPr id="5" name="Title 1">
+            <a:extLst>
+              <a:ext uri="{FF2B5EF4-FFF2-40B4-BE49-F238E27FC236}">
+                <a16:creationId xmlns:a16="http://schemas.microsoft.com/office/drawing/2014/main" id="{EDB9D38A-A6EE-B7FE-27E0-66F05EF7E955}"/>
+              </a:ext>
+            </a:extLst>
+          </p:cNvPr>
+          <p:cNvSpPr>
+            <a:spLocks noGrp="1"/>
+          </p:cNvSpPr>
+          <p:nvPr>
+            <p:ph type="title"/>
+          </p:nvPr>
+        </p:nvSpPr>
+        <p:spPr>
+          <a:xfrm>
+            <a:off x="450711" y="199575"/>
+            <a:ext cx="9692640" cy="773819"/>
+          </a:xfrm>
+        </p:spPr>
+        <p:txBody>
+          <a:bodyPr/>
+          <a:lstStyle/>
+          <a:p>
+            <a:r>
+              <a:rPr lang="en-GB" dirty="0"/>
+              <a:t>2.3 GSP Embedded Solar Capacity</a:t>
+            </a:r>
+          </a:p>
+        </p:txBody>
+      </p:sp>
+      <p:sp>
+        <p:nvSpPr>
+          <p:cNvPr id="7" name="TextBox 6">
+            <a:extLst>
+              <a:ext uri="{FF2B5EF4-FFF2-40B4-BE49-F238E27FC236}">
+                <a16:creationId xmlns:a16="http://schemas.microsoft.com/office/drawing/2014/main" id="{EE09C74F-7885-BCD6-9FD7-D0B50964E0FA}"/>
+              </a:ext>
+            </a:extLst>
+          </p:cNvPr>
+          <p:cNvSpPr txBox="1"/>
+          <p:nvPr/>
+        </p:nvSpPr>
+        <p:spPr>
+          <a:xfrm>
+            <a:off x="265471" y="1240770"/>
+            <a:ext cx="3864077" cy="5047536"/>
+          </a:xfrm>
+          <a:prstGeom prst="rect">
+            <a:avLst/>
+          </a:prstGeom>
+          <a:noFill/>
+        </p:spPr>
+        <p:txBody>
+          <a:bodyPr wrap="square">
+            <a:spAutoFit/>
+          </a:bodyPr>
+          <a:lstStyle/>
+          <a:p>
+            <a:r>
+              <a:rPr lang="en-GB" sz="1400" dirty="0"/>
+              <a:t>Bar Graph Showing New Installed Solar Capacity by Year:</a:t>
+            </a:r>
+          </a:p>
+          <a:p>
+            <a:endParaRPr lang="en-GB" sz="1400" dirty="0"/>
+          </a:p>
+          <a:p>
+            <a:r>
+              <a:rPr lang="en-GB" sz="1400" dirty="0"/>
+              <a:t>Major capacity gains were initially seen in 2011 following the launch of the FiT scheme in 2010 with a slight reduction in 2012 caused by reducing FiT support rates.</a:t>
+            </a:r>
+          </a:p>
+          <a:p>
+            <a:endParaRPr lang="en-GB" sz="1400" dirty="0"/>
+          </a:p>
+          <a:p>
+            <a:r>
+              <a:rPr lang="en-GB" sz="1400" dirty="0"/>
+              <a:t>Further growth to 2015 is seen as economies of scale drove down manufacturing costs granting viability for larger projects supported by the Renewable Obligation Certification (ROC). ROCs, however, were subsequently restricted to only new solar projects below 5MW in 2015, </a:t>
+            </a:r>
+            <a:r>
+              <a:rPr lang="en-GB" sz="1400" dirty="0" err="1"/>
+              <a:t>hecne</a:t>
+            </a:r>
+            <a:r>
+              <a:rPr lang="en-GB" sz="1400" dirty="0"/>
+              <a:t> the 2016 downward trend. </a:t>
+            </a:r>
+          </a:p>
+          <a:p>
+            <a:endParaRPr lang="en-GB" sz="1400" dirty="0"/>
+          </a:p>
+          <a:p>
+            <a:r>
+              <a:rPr lang="en-GB" sz="1400" dirty="0"/>
+              <a:t>From 2020 onwards capacity growth is purely subsidy-free given the complete closure of the FiT and ROC schemes for all new solar in 2019 and 2017, respectively. We note a recent tailing-off of new capacity as the grid becomes more congested.</a:t>
+            </a:r>
+          </a:p>
+        </p:txBody>
+      </p:sp>
+    </p:spTree>
+    <p:extLst>
+      <p:ext uri="{BB962C8B-B14F-4D97-AF65-F5344CB8AC3E}">
+        <p14:creationId xmlns:p14="http://schemas.microsoft.com/office/powerpoint/2010/main" val="2951981666"/>
       </p:ext>
     </p:extLst>
   </p:cSld>
@@ -11288,11 +11238,10 @@
             <a:pPr algn="l">
               <a:buNone/>
             </a:pPr>
-            <a:endParaRPr lang="en-GB" sz="1600" b="0" i="0" dirty="0">
+            <a:endParaRPr lang="en-GB" sz="1600" b="1" dirty="0">
               <a:solidFill>
                 <a:srgbClr val="FAFAFA"/>
               </a:solidFill>
-              <a:effectLst/>
             </a:endParaRPr>
           </a:p>
           <a:p>
@@ -11305,7 +11254,7 @@
                   <a:srgbClr val="FAFAFA"/>
                 </a:solidFill>
               </a:rPr>
-              <a:t>The plot to the right shows</a:t>
+              <a:t>Displaying</a:t>
             </a:r>
             <a:r>
               <a:rPr lang="en-GB" sz="1600" b="0" i="0" dirty="0">
@@ -11314,7 +11263,24 @@
                 </a:solidFill>
                 <a:effectLst/>
               </a:rPr>
-              <a:t> the variance between actual solar generation and our model's predicted generation. We note predictions tend to track irradiance more closely than actual generation. Reasons for this may include:</a:t>
+              <a:t> variance between actual solar generation and </a:t>
+            </a:r>
+            <a:r>
+              <a:rPr lang="en-GB" sz="1600" dirty="0">
+                <a:solidFill>
+                  <a:srgbClr val="FAFAFA"/>
+                </a:solidFill>
+              </a:rPr>
+              <a:t>the</a:t>
+            </a:r>
+            <a:r>
+              <a:rPr lang="en-GB" sz="1600" b="0" i="0" dirty="0">
+                <a:solidFill>
+                  <a:srgbClr val="FAFAFA"/>
+                </a:solidFill>
+                <a:effectLst/>
+              </a:rPr>
+              <a:t> model's predicted generation. We note predictions tend track irradiance more closely than actual generation does. Reasons for this may include:</a:t>
             </a:r>
           </a:p>
           <a:p>
@@ -11340,7 +11306,7 @@
                 </a:solidFill>
                 <a:effectLst/>
               </a:rPr>
-              <a:t>predictions are based on a single location (and weather conditions) at the GSP, but the solar plants are scattered in multiple locations around the GSP, and;</a:t>
+              <a:t>predictions are based on a single location (and weather conditions) at the GSP, but the solar plants are scattered in multiple locations in the GSP region, and;</a:t>
             </a:r>
           </a:p>
           <a:p>
@@ -11367,7 +11333,7 @@
                 </a:solidFill>
                 <a:effectLst/>
               </a:rPr>
-              <a:t>generation may have been affected by other factors such as grid and/or localised plant faults.</a:t>
+              <a:t>generation may have been affected by other factors such as grid and/or localised plant faults not captured by our data.</a:t>
             </a:r>
           </a:p>
         </p:txBody>
@@ -11750,7 +11716,7 @@
         <p:spPr>
           <a:xfrm>
             <a:off x="8432539" y="1607574"/>
-            <a:ext cx="2746740" cy="4247317"/>
+            <a:ext cx="2746740" cy="3970318"/>
           </a:xfrm>
           <a:prstGeom prst="rect">
             <a:avLst/>
@@ -11778,7 +11744,7 @@
                   <a:srgbClr val="FAFAFA"/>
                 </a:solidFill>
               </a:rPr>
-              <a:t>e actual solar generation vs. predicted over time :</a:t>
+              <a:t>e actual solar generation vs. predicted over time:</a:t>
             </a:r>
             <a:br>
               <a:rPr lang="en-GB" dirty="0">
@@ -11800,7 +11766,7 @@
                   <a:srgbClr val="FAFAFA"/>
                 </a:solidFill>
               </a:rPr>
-              <a:t>The model becomes more inaccurate over time as solar capacity increases.</a:t>
+              <a:t>The model becomes increasingly inaccurate over time as solar capacity increases.</a:t>
             </a:r>
           </a:p>
           <a:p>
@@ -11813,20 +11779,12 @@
           </a:p>
           <a:p>
             <a:r>
-              <a:rPr lang="en-GB" b="1" dirty="0">
-                <a:solidFill>
-                  <a:srgbClr val="FAFAFA"/>
-                </a:solidFill>
-              </a:rPr>
-              <a:t>Solution: </a:t>
-            </a:r>
-            <a:r>
               <a:rPr lang="en-GB" dirty="0">
                 <a:solidFill>
                   <a:srgbClr val="FAFAFA"/>
                 </a:solidFill>
               </a:rPr>
-              <a:t>heavily</a:t>
+              <a:t>Solution: heavily</a:t>
             </a:r>
             <a:r>
               <a:rPr lang="en-GB" b="1" dirty="0">
@@ -11842,7 +11800,7 @@
                   <a:srgbClr val="FAFAFA"/>
                 </a:solidFill>
               </a:rPr>
-              <a:t>weight the GSPs solar capacity feature in future fine-tuning of the ML model</a:t>
+              <a:t>weight the GSPs solar capacity feature in next iteration of the ML model</a:t>
             </a:r>
             <a:endParaRPr lang="en-GB" b="0" i="0" dirty="0">
               <a:solidFill>
@@ -11907,7 +11865,7 @@
         </p:nvSpPr>
         <p:spPr>
           <a:xfrm>
-            <a:off x="579604" y="434797"/>
+            <a:off x="579604" y="248584"/>
             <a:ext cx="9905998" cy="848139"/>
           </a:xfrm>
         </p:spPr>
@@ -11940,7 +11898,7 @@
             <p:ph idx="1"/>
             <p:extLst>
               <p:ext uri="{D42A27DB-BD31-4B8C-83A1-F6EECF244321}">
-                <p14:modId xmlns:p14="http://schemas.microsoft.com/office/powerpoint/2010/main" val="3397225068"/>
+                <p14:modId xmlns:p14="http://schemas.microsoft.com/office/powerpoint/2010/main" val="347297268"/>
               </p:ext>
               <p:ext uri="{E7BDC344-281C-4309-B0C6-D0EE65EED2A8}">
                 <p202:designPr xmlns:p202="http://schemas.microsoft.com/office/powerpoint/2020/02/main">
@@ -11953,7 +11911,7 @@
           </p:nvPr>
         </p:nvGraphicFramePr>
         <p:xfrm>
-          <a:off x="579604" y="1331219"/>
+          <a:off x="579604" y="1096723"/>
           <a:ext cx="10466937" cy="1932136"/>
         </p:xfrm>
         <a:graphic>
@@ -12202,7 +12160,7 @@
           <p:nvPr>
             <p:extLst>
               <p:ext uri="{D42A27DB-BD31-4B8C-83A1-F6EECF244321}">
-                <p14:modId xmlns:p14="http://schemas.microsoft.com/office/powerpoint/2010/main" val="2834024997"/>
+                <p14:modId xmlns:p14="http://schemas.microsoft.com/office/powerpoint/2010/main" val="158840036"/>
               </p:ext>
               <p:ext uri="{E7BDC344-281C-4309-B0C6-D0EE65EED2A8}">
                 <p202:designPr xmlns:p202="http://schemas.microsoft.com/office/powerpoint/2020/02/main">
@@ -12215,8 +12173,8 @@
           </p:nvPr>
         </p:nvGraphicFramePr>
         <p:xfrm>
-          <a:off x="579604" y="3311639"/>
-          <a:ext cx="10466938" cy="3111564"/>
+          <a:off x="579604" y="3028859"/>
+          <a:ext cx="10466938" cy="3594598"/>
         </p:xfrm>
         <a:graphic>
           <a:graphicData uri="http://schemas.openxmlformats.org/drawingml/2006/table">
@@ -12523,7 +12481,7 @@
                             <a:schemeClr val="tx1"/>
                           </a:solidFill>
                         </a:rPr>
-                        <a:t>streamlit</a:t>
+                        <a:t>streamlit_app</a:t>
                       </a:r>
                       <a:r>
                         <a:rPr lang="en-GB" sz="1400" cap="none" spc="0" dirty="0">
@@ -12531,7 +12489,59 @@
                             <a:schemeClr val="tx1"/>
                           </a:solidFill>
                         </a:rPr>
-                        <a:t> app to remove interdependencies between themselves so they can be moved to the functions.py file and used with date and GSP sidebar selectors without causing a circular reference</a:t>
+                        <a:t> file to remove interdependencies so they can be moved to the functions.py file and used with date and GSP sidebar selectors without causing a circular reference</a:t>
+                      </a:r>
+                    </a:p>
+                  </a:txBody>
+                  <a:tcPr marL="134837" marR="134837" marT="134837" marB="134837" anchor="ctr">
+                    <a:lnL w="12700" cmpd="sng">
+                      <a:noFill/>
+                      <a:prstDash val="solid"/>
+                    </a:lnL>
+                    <a:lnR w="12700" cmpd="sng">
+                      <a:noFill/>
+                      <a:prstDash val="solid"/>
+                    </a:lnR>
+                    <a:lnT w="6350" cap="flat" cmpd="sng" algn="ctr">
+                      <a:solidFill>
+                        <a:schemeClr val="tx1"/>
+                      </a:solidFill>
+                      <a:prstDash val="solid"/>
+                    </a:lnT>
+                    <a:lnB w="6350" cap="flat" cmpd="sng" algn="ctr">
+                      <a:solidFill>
+                        <a:schemeClr val="tx1"/>
+                      </a:solidFill>
+                      <a:prstDash val="solid"/>
+                      <a:round/>
+                      <a:headEnd type="none" w="med" len="med"/>
+                      <a:tailEnd type="none" w="med" len="med"/>
+                    </a:lnB>
+                    <a:noFill/>
+                  </a:tcPr>
+                </a:tc>
+                <a:extLst>
+                  <a:ext uri="{0D108BD9-81ED-4DB2-BD59-A6C34878D82A}">
+                    <a16:rowId xmlns:a16="http://schemas.microsoft.com/office/drawing/2014/main" val="2113425263"/>
+                  </a:ext>
+                </a:extLst>
+              </a:tr>
+              <a:tr h="0">
+                <a:tc>
+                  <a:txBody>
+                    <a:bodyPr/>
+                    <a:lstStyle/>
+                    <a:p>
+                      <a:pPr algn="ctr">
+                        <a:buNone/>
+                      </a:pPr>
+                      <a:r>
+                        <a:rPr lang="en-GB" sz="1400" cap="none" spc="0" dirty="0">
+                          <a:solidFill>
+                            <a:schemeClr val="tx1"/>
+                          </a:solidFill>
+                        </a:rPr>
+                        <a:t>Extract data on grid faults and other network management affecting generation to include in predictive model</a:t>
                       </a:r>
                     </a:p>
                   </a:txBody>
@@ -12561,7 +12571,7 @@
                 </a:tc>
                 <a:extLst>
                   <a:ext uri="{0D108BD9-81ED-4DB2-BD59-A6C34878D82A}">
-                    <a16:rowId xmlns:a16="http://schemas.microsoft.com/office/drawing/2014/main" val="2113425263"/>
+                    <a16:rowId xmlns:a16="http://schemas.microsoft.com/office/drawing/2014/main" val="736505748"/>
                   </a:ext>
                 </a:extLst>
               </a:tr>
@@ -12926,6 +12936,111 @@
 </file>
 
 <file path=ppt/slides/slide2.xml><?xml version="1.0" encoding="utf-8"?>
+<p:sld xmlns:a="http://schemas.openxmlformats.org/drawingml/2006/main" xmlns:r="http://schemas.openxmlformats.org/officeDocument/2006/relationships" xmlns:p="http://schemas.openxmlformats.org/presentationml/2006/main">
+  <p:cSld>
+    <p:spTree>
+      <p:nvGrpSpPr>
+        <p:cNvPr id="1" name=""/>
+        <p:cNvGrpSpPr/>
+        <p:nvPr/>
+      </p:nvGrpSpPr>
+      <p:grpSpPr>
+        <a:xfrm>
+          <a:off x="0" y="0"/>
+          <a:ext cx="0" cy="0"/>
+          <a:chOff x="0" y="0"/>
+          <a:chExt cx="0" cy="0"/>
+        </a:xfrm>
+      </p:grpSpPr>
+      <p:sp>
+        <p:nvSpPr>
+          <p:cNvPr id="2" name="Title 1">
+            <a:extLst>
+              <a:ext uri="{FF2B5EF4-FFF2-40B4-BE49-F238E27FC236}">
+                <a16:creationId xmlns:a16="http://schemas.microsoft.com/office/drawing/2014/main" id="{5AA3460F-A84A-45A2-5A70-D69BE6DEA8DA}"/>
+              </a:ext>
+            </a:extLst>
+          </p:cNvPr>
+          <p:cNvSpPr>
+            <a:spLocks noGrp="1"/>
+          </p:cNvSpPr>
+          <p:nvPr>
+            <p:ph type="title"/>
+          </p:nvPr>
+        </p:nvSpPr>
+        <p:spPr>
+          <a:xfrm>
+            <a:off x="539200" y="486134"/>
+            <a:ext cx="9692640" cy="1325562"/>
+          </a:xfrm>
+        </p:spPr>
+        <p:txBody>
+          <a:bodyPr/>
+          <a:lstStyle/>
+          <a:p>
+            <a:r>
+              <a:rPr lang="en-GB" dirty="0"/>
+              <a:t>Our Purpose:</a:t>
+            </a:r>
+          </a:p>
+        </p:txBody>
+      </p:sp>
+      <p:sp>
+        <p:nvSpPr>
+          <p:cNvPr id="3" name="Content Placeholder 2">
+            <a:extLst>
+              <a:ext uri="{FF2B5EF4-FFF2-40B4-BE49-F238E27FC236}">
+                <a16:creationId xmlns:a16="http://schemas.microsoft.com/office/drawing/2014/main" id="{796826B3-5996-AA4C-7E9E-09614B7FC030}"/>
+              </a:ext>
+            </a:extLst>
+          </p:cNvPr>
+          <p:cNvSpPr>
+            <a:spLocks noGrp="1"/>
+          </p:cNvSpPr>
+          <p:nvPr>
+            <p:ph idx="1"/>
+          </p:nvPr>
+        </p:nvSpPr>
+        <p:spPr>
+          <a:xfrm>
+            <a:off x="539200" y="2020530"/>
+            <a:ext cx="10282575" cy="2889674"/>
+          </a:xfrm>
+        </p:spPr>
+        <p:txBody>
+          <a:bodyPr>
+            <a:normAutofit lnSpcReduction="10000"/>
+          </a:bodyPr>
+          <a:lstStyle/>
+          <a:p>
+            <a:r>
+              <a:rPr lang="en-GB" sz="2800" dirty="0"/>
+              <a:t>To forecast the embedded solar generation at GSPs in the UK with sufficient accuracy to refine NESO’s instructions in the BM.</a:t>
+            </a:r>
+          </a:p>
+          <a:p>
+            <a:r>
+              <a:rPr lang="en-GB" sz="2800" dirty="0"/>
+              <a:t>Thereby increasing the operating efficiency of the UK electricity network by reducing redundancy in NESO’s balancing actions and creating savings which will flow down to UK consumers.</a:t>
+            </a:r>
+            <a:endParaRPr lang="en-GB" dirty="0"/>
+          </a:p>
+        </p:txBody>
+      </p:sp>
+    </p:spTree>
+    <p:extLst>
+      <p:ext uri="{BB962C8B-B14F-4D97-AF65-F5344CB8AC3E}">
+        <p14:creationId xmlns:p14="http://schemas.microsoft.com/office/powerpoint/2010/main" val="3240610859"/>
+      </p:ext>
+    </p:extLst>
+  </p:cSld>
+  <p:clrMapOvr>
+    <a:masterClrMapping/>
+  </p:clrMapOvr>
+</p:sld>
+</file>
+
+<file path=ppt/slides/slide3.xml><?xml version="1.0" encoding="utf-8"?>
 <p:sld xmlns:a="http://schemas.openxmlformats.org/drawingml/2006/main" xmlns:r="http://schemas.openxmlformats.org/officeDocument/2006/relationships" xmlns:p="http://schemas.openxmlformats.org/presentationml/2006/main">
   <p:cSld>
     <p:spTree>
@@ -13486,7 +13601,7 @@
 </p:sld>
 </file>
 
-<file path=ppt/slides/slide3.xml><?xml version="1.0" encoding="utf-8"?>
+<file path=ppt/slides/slide4.xml><?xml version="1.0" encoding="utf-8"?>
 <p:sld xmlns:a="http://schemas.openxmlformats.org/drawingml/2006/main" xmlns:r="http://schemas.openxmlformats.org/officeDocument/2006/relationships" xmlns:p="http://schemas.openxmlformats.org/presentationml/2006/main">
   <p:cSld>
     <p:bg>
@@ -13806,7 +13921,7 @@
 </p:sld>
 </file>
 
-<file path=ppt/slides/slide4.xml><?xml version="1.0" encoding="utf-8"?>
+<file path=ppt/slides/slide5.xml><?xml version="1.0" encoding="utf-8"?>
 <p:sld xmlns:a="http://schemas.openxmlformats.org/drawingml/2006/main" xmlns:r="http://schemas.openxmlformats.org/officeDocument/2006/relationships" xmlns:p="http://schemas.openxmlformats.org/presentationml/2006/main">
   <p:cSld>
     <p:bg>
@@ -14103,7 +14218,7 @@
           <a:p>
             <a:r>
               <a:rPr lang="en-GB" dirty="0"/>
-              <a:t>The increasing volume of generators connected to the Distribution Network makes NESO’s activities increasingly more challenging and essential to have accurate data sources and prediction</a:t>
+              <a:t>The increasing volume of generators connected to the Distribution Network makes NESO’s activities increasingly more challenging and essential to have accurate data sources and generation predictions.</a:t>
             </a:r>
             <a:endParaRPr lang="en-US" dirty="0"/>
           </a:p>
@@ -14122,7 +14237,7 @@
 </p:sld>
 </file>
 
-<file path=ppt/slides/slide5.xml><?xml version="1.0" encoding="utf-8"?>
+<file path=ppt/slides/slide6.xml><?xml version="1.0" encoding="utf-8"?>
 <p:sld xmlns:a="http://schemas.openxmlformats.org/drawingml/2006/main" xmlns:r="http://schemas.openxmlformats.org/officeDocument/2006/relationships" xmlns:p="http://schemas.openxmlformats.org/presentationml/2006/main">
   <p:cSld>
     <p:bg>
@@ -14406,7 +14521,15 @@
             </a:br>
             <a:r>
               <a:rPr lang="en-US" sz="1200" dirty="0"/>
-              <a:t>The UK national electricity grid network was originally designed in the 1950s for transporting electricity from traditional large-scale base-load turbine generators connected to the transmission network (132kV and above) which subsequently supply the distribution network (132kV and below) to then feed our homes and businesses.</a:t>
+              <a:t>The UK national electricity grid network was originally designed in the first half of the 20</a:t>
+            </a:r>
+            <a:r>
+              <a:rPr lang="en-US" sz="1200" baseline="30000" dirty="0"/>
+              <a:t>th</a:t>
+            </a:r>
+            <a:r>
+              <a:rPr lang="en-US" sz="1200" dirty="0"/>
+              <a:t> Century for transporting electricity from traditional large-scale base-load turbine generators connected to the transmission network (275kV and above) which subsequently supply the distribution network (275kV and below) to then feed our homes and businesses.</a:t>
             </a:r>
           </a:p>
           <a:p>
@@ -14415,7 +14538,7 @@
             </a:pPr>
             <a:r>
               <a:rPr lang="en-US" sz="1200" dirty="0"/>
-              <a:t>Solar and battery power plants tend to be much smaller than traditional turbine generators meaning they are connected at lower voltages directly to the distribution networks (132kV and below – i.e., embedded Generation):</a:t>
+              <a:t>Solar and battery power plants tend to be much smaller than traditional turbine generators meaning they are connected at lower voltages directly to the distribution networks (275kV and below – i.e., embedded Generation):</a:t>
             </a:r>
           </a:p>
           <a:p>
@@ -14453,355 +14576,7 @@
 </p:sld>
 </file>
 
-<file path=ppt/slides/slide6.xml><?xml version="1.0" encoding="utf-8"?>
-<p:sld xmlns:a="http://schemas.openxmlformats.org/drawingml/2006/main" xmlns:r="http://schemas.openxmlformats.org/officeDocument/2006/relationships" xmlns:p="http://schemas.openxmlformats.org/presentationml/2006/main">
-  <p:cSld>
-    <p:spTree>
-      <p:nvGrpSpPr>
-        <p:cNvPr id="1" name=""/>
-        <p:cNvGrpSpPr/>
-        <p:nvPr/>
-      </p:nvGrpSpPr>
-      <p:grpSpPr>
-        <a:xfrm>
-          <a:off x="0" y="0"/>
-          <a:ext cx="0" cy="0"/>
-          <a:chOff x="0" y="0"/>
-          <a:chExt cx="0" cy="0"/>
-        </a:xfrm>
-      </p:grpSpPr>
-      <p:sp>
-        <p:nvSpPr>
-          <p:cNvPr id="2" name="Title 1">
-            <a:extLst>
-              <a:ext uri="{FF2B5EF4-FFF2-40B4-BE49-F238E27FC236}">
-                <a16:creationId xmlns:a16="http://schemas.microsoft.com/office/drawing/2014/main" id="{2440D2A0-EA5E-1D9B-7EC9-9AC800D4C0E1}"/>
-              </a:ext>
-            </a:extLst>
-          </p:cNvPr>
-          <p:cNvSpPr>
-            <a:spLocks noGrp="1"/>
-          </p:cNvSpPr>
-          <p:nvPr>
-            <p:ph type="title"/>
-          </p:nvPr>
-        </p:nvSpPr>
-        <p:spPr>
-          <a:xfrm>
-            <a:off x="450711" y="199575"/>
-            <a:ext cx="9692640" cy="773819"/>
-          </a:xfrm>
-        </p:spPr>
-        <p:txBody>
-          <a:bodyPr/>
-          <a:lstStyle/>
-          <a:p>
-            <a:r>
-              <a:rPr lang="en-GB" dirty="0"/>
-              <a:t>1.4 GSP Embedded Solar Capacity</a:t>
-            </a:r>
-          </a:p>
-        </p:txBody>
-      </p:sp>
-      <p:pic>
-        <p:nvPicPr>
-          <p:cNvPr id="6" name="Picture 5">
-            <a:extLst>
-              <a:ext uri="{FF2B5EF4-FFF2-40B4-BE49-F238E27FC236}">
-                <a16:creationId xmlns:a16="http://schemas.microsoft.com/office/drawing/2014/main" id="{05C0D5EA-4B12-9E75-C267-2787F569D617}"/>
-              </a:ext>
-            </a:extLst>
-          </p:cNvPr>
-          <p:cNvPicPr>
-            <a:picLocks noChangeAspect="1"/>
-          </p:cNvPicPr>
-          <p:nvPr/>
-        </p:nvPicPr>
-        <p:blipFill>
-          <a:blip r:embed="rId2"/>
-          <a:stretch>
-            <a:fillRect/>
-          </a:stretch>
-        </p:blipFill>
-        <p:spPr>
-          <a:xfrm>
-            <a:off x="3944456" y="973394"/>
-            <a:ext cx="7161080" cy="5523564"/>
-          </a:xfrm>
-          <a:prstGeom prst="rect">
-            <a:avLst/>
-          </a:prstGeom>
-        </p:spPr>
-      </p:pic>
-      <p:sp>
-        <p:nvSpPr>
-          <p:cNvPr id="8" name="TextBox 7">
-            <a:extLst>
-              <a:ext uri="{FF2B5EF4-FFF2-40B4-BE49-F238E27FC236}">
-                <a16:creationId xmlns:a16="http://schemas.microsoft.com/office/drawing/2014/main" id="{2D3A1E08-1FA9-6E6C-873F-BE4C9C0D8394}"/>
-              </a:ext>
-            </a:extLst>
-          </p:cNvPr>
-          <p:cNvSpPr txBox="1"/>
-          <p:nvPr/>
-        </p:nvSpPr>
-        <p:spPr>
-          <a:xfrm>
-            <a:off x="450711" y="1196019"/>
-            <a:ext cx="3493745" cy="4770537"/>
-          </a:xfrm>
-          <a:prstGeom prst="rect">
-            <a:avLst/>
-          </a:prstGeom>
-          <a:noFill/>
-        </p:spPr>
-        <p:txBody>
-          <a:bodyPr wrap="square">
-            <a:spAutoFit/>
-          </a:bodyPr>
-          <a:lstStyle/>
-          <a:p>
-            <a:pPr algn="l">
-              <a:buNone/>
-            </a:pPr>
-            <a:r>
-              <a:rPr lang="en-GB" sz="1600" b="1" i="0" dirty="0">
-                <a:solidFill>
-                  <a:srgbClr val="FAFAFA"/>
-                </a:solidFill>
-                <a:effectLst/>
-              </a:rPr>
-              <a:t>UK Embedded Solar Capacity Over Time:</a:t>
-            </a:r>
-          </a:p>
-          <a:p>
-            <a:pPr algn="l">
-              <a:buNone/>
-            </a:pPr>
-            <a:endParaRPr lang="en-GB" sz="1600" b="0" i="0" dirty="0">
-              <a:solidFill>
-                <a:srgbClr val="FAFAFA"/>
-              </a:solidFill>
-              <a:effectLst/>
-            </a:endParaRPr>
-          </a:p>
-          <a:p>
-            <a:pPr algn="l">
-              <a:buNone/>
-            </a:pPr>
-            <a:r>
-              <a:rPr lang="en-GB" sz="1600" b="0" i="0" dirty="0">
-                <a:solidFill>
-                  <a:srgbClr val="FAFAFA"/>
-                </a:solidFill>
-                <a:effectLst/>
-              </a:rPr>
-              <a:t>Significant growth of solar capacity over the past 15 years was driven initially by the Feed-in-Tariff (FiT) subsidy scheme from 2010 to 2015 with later growth marked by the reducing cost of building and maintaining solar, making it now one of the cheapest forms of producing electricity. </a:t>
-            </a:r>
-          </a:p>
-          <a:p>
-            <a:pPr algn="l">
-              <a:buNone/>
-            </a:pPr>
-            <a:endParaRPr lang="en-GB" sz="1600" dirty="0">
-              <a:solidFill>
-                <a:srgbClr val="FAFAFA"/>
-              </a:solidFill>
-            </a:endParaRPr>
-          </a:p>
-          <a:p>
-            <a:pPr algn="l">
-              <a:buNone/>
-            </a:pPr>
-            <a:r>
-              <a:rPr lang="en-GB" sz="1600" b="0" i="0" dirty="0">
-                <a:solidFill>
-                  <a:srgbClr val="FAFAFA"/>
-                </a:solidFill>
-                <a:effectLst/>
-              </a:rPr>
-              <a:t>The latest challenge faced by the industry is now caused by an over-congested UK electricity grid network. Particularly for larger installations which are struggling to find capacity on the network.</a:t>
-            </a:r>
-          </a:p>
-        </p:txBody>
-      </p:sp>
-    </p:spTree>
-    <p:extLst>
-      <p:ext uri="{BB962C8B-B14F-4D97-AF65-F5344CB8AC3E}">
-        <p14:creationId xmlns:p14="http://schemas.microsoft.com/office/powerpoint/2010/main" val="291884891"/>
-      </p:ext>
-    </p:extLst>
-  </p:cSld>
-  <p:clrMapOvr>
-    <a:masterClrMapping/>
-  </p:clrMapOvr>
-</p:sld>
-</file>
-
 <file path=ppt/slides/slide7.xml><?xml version="1.0" encoding="utf-8"?>
-<p:sld xmlns:a="http://schemas.openxmlformats.org/drawingml/2006/main" xmlns:r="http://schemas.openxmlformats.org/officeDocument/2006/relationships" xmlns:p="http://schemas.openxmlformats.org/presentationml/2006/main">
-  <p:cSld>
-    <p:spTree>
-      <p:nvGrpSpPr>
-        <p:cNvPr id="1" name=""/>
-        <p:cNvGrpSpPr/>
-        <p:nvPr/>
-      </p:nvGrpSpPr>
-      <p:grpSpPr>
-        <a:xfrm>
-          <a:off x="0" y="0"/>
-          <a:ext cx="0" cy="0"/>
-          <a:chOff x="0" y="0"/>
-          <a:chExt cx="0" cy="0"/>
-        </a:xfrm>
-      </p:grpSpPr>
-      <p:pic>
-        <p:nvPicPr>
-          <p:cNvPr id="4" name="Picture 3">
-            <a:extLst>
-              <a:ext uri="{FF2B5EF4-FFF2-40B4-BE49-F238E27FC236}">
-                <a16:creationId xmlns:a16="http://schemas.microsoft.com/office/drawing/2014/main" id="{AB34F1EE-A363-BBFC-549A-21F029F967E9}"/>
-              </a:ext>
-            </a:extLst>
-          </p:cNvPr>
-          <p:cNvPicPr>
-            <a:picLocks noChangeAspect="1"/>
-          </p:cNvPicPr>
-          <p:nvPr/>
-        </p:nvPicPr>
-        <p:blipFill>
-          <a:blip r:embed="rId2"/>
-          <a:stretch>
-            <a:fillRect/>
-          </a:stretch>
-        </p:blipFill>
-        <p:spPr>
-          <a:xfrm>
-            <a:off x="4129548" y="1212986"/>
-            <a:ext cx="7092404" cy="4747670"/>
-          </a:xfrm>
-          <a:prstGeom prst="rect">
-            <a:avLst/>
-          </a:prstGeom>
-        </p:spPr>
-      </p:pic>
-      <p:sp>
-        <p:nvSpPr>
-          <p:cNvPr id="5" name="Title 1">
-            <a:extLst>
-              <a:ext uri="{FF2B5EF4-FFF2-40B4-BE49-F238E27FC236}">
-                <a16:creationId xmlns:a16="http://schemas.microsoft.com/office/drawing/2014/main" id="{EDB9D38A-A6EE-B7FE-27E0-66F05EF7E955}"/>
-              </a:ext>
-            </a:extLst>
-          </p:cNvPr>
-          <p:cNvSpPr>
-            <a:spLocks noGrp="1"/>
-          </p:cNvSpPr>
-          <p:nvPr>
-            <p:ph type="title"/>
-          </p:nvPr>
-        </p:nvSpPr>
-        <p:spPr>
-          <a:xfrm>
-            <a:off x="450711" y="199575"/>
-            <a:ext cx="9692640" cy="773819"/>
-          </a:xfrm>
-        </p:spPr>
-        <p:txBody>
-          <a:bodyPr/>
-          <a:lstStyle/>
-          <a:p>
-            <a:r>
-              <a:rPr lang="en-GB" dirty="0"/>
-              <a:t>1.5 GSP Embedded Solar Capacity</a:t>
-            </a:r>
-          </a:p>
-        </p:txBody>
-      </p:sp>
-      <p:sp>
-        <p:nvSpPr>
-          <p:cNvPr id="7" name="TextBox 6">
-            <a:extLst>
-              <a:ext uri="{FF2B5EF4-FFF2-40B4-BE49-F238E27FC236}">
-                <a16:creationId xmlns:a16="http://schemas.microsoft.com/office/drawing/2014/main" id="{EE09C74F-7885-BCD6-9FD7-D0B50964E0FA}"/>
-              </a:ext>
-            </a:extLst>
-          </p:cNvPr>
-          <p:cNvSpPr txBox="1"/>
-          <p:nvPr/>
-        </p:nvSpPr>
-        <p:spPr>
-          <a:xfrm>
-            <a:off x="265471" y="1240770"/>
-            <a:ext cx="3864077" cy="5047536"/>
-          </a:xfrm>
-          <a:prstGeom prst="rect">
-            <a:avLst/>
-          </a:prstGeom>
-          <a:noFill/>
-        </p:spPr>
-        <p:txBody>
-          <a:bodyPr wrap="square">
-            <a:spAutoFit/>
-          </a:bodyPr>
-          <a:lstStyle/>
-          <a:p>
-            <a:r>
-              <a:rPr lang="en-GB" sz="1400" dirty="0"/>
-              <a:t>Bar Graph Showing New Installed Solar Capacity by Year:</a:t>
-            </a:r>
-          </a:p>
-          <a:p>
-            <a:endParaRPr lang="en-GB" sz="1400" dirty="0"/>
-          </a:p>
-          <a:p>
-            <a:r>
-              <a:rPr lang="en-GB" sz="1400" dirty="0"/>
-              <a:t>Major capacity gains were initially seen in 2011 following the launch of the FiT scheme in 2010 with a slight reduction in 2012 caused by reducing FiT support rates.</a:t>
-            </a:r>
-          </a:p>
-          <a:p>
-            <a:endParaRPr lang="en-GB" sz="1400" dirty="0"/>
-          </a:p>
-          <a:p>
-            <a:r>
-              <a:rPr lang="en-GB" sz="1400" dirty="0"/>
-              <a:t>Further growth to 2015 is seen as economies of scale drove down manufacturing costs granting viability for larger projects supported by the Renewable Obligation Certification (ROC). ROCs, however, were subsequently restricted to only new solar projects below 5MW in 2015, </a:t>
-            </a:r>
-            <a:r>
-              <a:rPr lang="en-GB" sz="1400" dirty="0" err="1"/>
-              <a:t>hecne</a:t>
-            </a:r>
-            <a:r>
-              <a:rPr lang="en-GB" sz="1400" dirty="0"/>
-              <a:t> the 2016 downward trend. </a:t>
-            </a:r>
-          </a:p>
-          <a:p>
-            <a:endParaRPr lang="en-GB" sz="1400" dirty="0"/>
-          </a:p>
-          <a:p>
-            <a:r>
-              <a:rPr lang="en-GB" sz="1400" dirty="0"/>
-              <a:t>From 2020 onwards capacity growth is purely subsidy-free given the complete closure of the FiT and ROC schemes for all new solar in 2019 and 2017, respectively. We note a recent tailing-off of new capacity as the grid becomes more congested.</a:t>
-            </a:r>
-          </a:p>
-        </p:txBody>
-      </p:sp>
-    </p:spTree>
-    <p:extLst>
-      <p:ext uri="{BB962C8B-B14F-4D97-AF65-F5344CB8AC3E}">
-        <p14:creationId xmlns:p14="http://schemas.microsoft.com/office/powerpoint/2010/main" val="2951981666"/>
-      </p:ext>
-    </p:extLst>
-  </p:cSld>
-  <p:clrMapOvr>
-    <a:masterClrMapping/>
-  </p:clrMapOvr>
-</p:sld>
-</file>
-
-<file path=ppt/slides/slide8.xml><?xml version="1.0" encoding="utf-8"?>
 <p:sld xmlns:a="http://schemas.openxmlformats.org/drawingml/2006/main" xmlns:r="http://schemas.openxmlformats.org/officeDocument/2006/relationships" xmlns:p="http://schemas.openxmlformats.org/presentationml/2006/main">
   <p:cSld>
     <p:bg>
@@ -14918,7 +14693,7 @@
           <a:p>
             <a:r>
               <a:rPr lang="en-US" sz="3200" dirty="0"/>
-              <a:t>1.6 Grid Supply Points (GSPs)</a:t>
+              <a:t>1.4 Grid Supply Points (GSPs)</a:t>
             </a:r>
           </a:p>
         </p:txBody>
@@ -15020,7 +14795,7 @@
             </a:pPr>
             <a:r>
               <a:rPr lang="en-US" sz="2000" b="1" dirty="0"/>
-              <a:t>GSPs are essentially large-scale substations which act as nodes which intersect between the Distribution and Transmission networks, and;</a:t>
+              <a:t>GSPs are essentially large-scale substations which act as nodes intersecting between the Distribution and Transmission networks, and;</a:t>
             </a:r>
           </a:p>
           <a:p>
@@ -15068,9 +14843,153 @@
 </p:sld>
 </file>
 
+<file path=ppt/slides/slide8.xml><?xml version="1.0" encoding="utf-8"?>
+<p:sld xmlns:a="http://schemas.openxmlformats.org/drawingml/2006/main" xmlns:r="http://schemas.openxmlformats.org/officeDocument/2006/relationships" xmlns:p="http://schemas.openxmlformats.org/presentationml/2006/main">
+  <p:cSld>
+    <p:bg>
+      <p:bgPr>
+        <a:solidFill>
+          <a:schemeClr val="bg1"/>
+        </a:solidFill>
+        <a:effectLst/>
+      </p:bgPr>
+    </p:bg>
+    <p:spTree>
+      <p:nvGrpSpPr>
+        <p:cNvPr id="1" name=""/>
+        <p:cNvGrpSpPr/>
+        <p:nvPr/>
+      </p:nvGrpSpPr>
+      <p:grpSpPr>
+        <a:xfrm>
+          <a:off x="0" y="0"/>
+          <a:ext cx="0" cy="0"/>
+          <a:chOff x="0" y="0"/>
+          <a:chExt cx="0" cy="0"/>
+        </a:xfrm>
+      </p:grpSpPr>
+      <p:pic>
+        <p:nvPicPr>
+          <p:cNvPr id="8" name="Content Placeholder 4" descr="Digital Numbers">
+            <a:extLst>
+              <a:ext uri="{FF2B5EF4-FFF2-40B4-BE49-F238E27FC236}">
+                <a16:creationId xmlns:a16="http://schemas.microsoft.com/office/drawing/2014/main" id="{EA70616B-E344-4856-8DF9-707C26236613}"/>
+              </a:ext>
+            </a:extLst>
+          </p:cNvPr>
+          <p:cNvPicPr>
+            <a:picLocks noChangeAspect="1"/>
+          </p:cNvPicPr>
+          <p:nvPr/>
+        </p:nvPicPr>
+        <p:blipFill rotWithShape="1">
+          <a:blip r:embed="rId3" cstate="screen">
+            <a:extLst>
+              <a:ext uri="{28A0092B-C50C-407E-A947-70E740481C1C}">
+                <a14:useLocalDpi xmlns:a14="http://schemas.microsoft.com/office/drawing/2010/main"/>
+              </a:ext>
+            </a:extLst>
+          </a:blip>
+          <a:srcRect t="10681" r="9091" b="12711"/>
+          <a:stretch/>
+        </p:blipFill>
+        <p:spPr>
+          <a:xfrm>
+            <a:off x="20" y="0"/>
+            <a:ext cx="12191980" cy="6857990"/>
+          </a:xfrm>
+          <a:prstGeom prst="rect">
+            <a:avLst/>
+          </a:prstGeom>
+        </p:spPr>
+      </p:pic>
+      <p:graphicFrame>
+        <p:nvGraphicFramePr>
+          <p:cNvPr id="12" name="Diagram 11">
+            <a:extLst>
+              <a:ext uri="{FF2B5EF4-FFF2-40B4-BE49-F238E27FC236}">
+                <a16:creationId xmlns:a16="http://schemas.microsoft.com/office/drawing/2014/main" id="{C538149B-35A8-3FDD-F655-69C12E0CAC46}"/>
+              </a:ext>
+            </a:extLst>
+          </p:cNvPr>
+          <p:cNvGraphicFramePr/>
+          <p:nvPr>
+            <p:extLst>
+              <p:ext uri="{D42A27DB-BD31-4B8C-83A1-F6EECF244321}">
+                <p14:modId xmlns:p14="http://schemas.microsoft.com/office/powerpoint/2010/main" val="352904196"/>
+              </p:ext>
+            </p:extLst>
+          </p:nvPr>
+        </p:nvGraphicFramePr>
+        <p:xfrm>
+          <a:off x="3013067" y="580193"/>
+          <a:ext cx="10456605" cy="5697603"/>
+        </p:xfrm>
+        <a:graphic>
+          <a:graphicData uri="http://schemas.openxmlformats.org/drawingml/2006/diagram">
+            <dgm:relIds xmlns:dgm="http://schemas.openxmlformats.org/drawingml/2006/diagram" xmlns:r="http://schemas.openxmlformats.org/officeDocument/2006/relationships" r:dm="rId4" r:lo="rId5" r:qs="rId6" r:cs="rId7"/>
+          </a:graphicData>
+        </a:graphic>
+      </p:graphicFrame>
+      <p:sp>
+        <p:nvSpPr>
+          <p:cNvPr id="13" name="Title 1">
+            <a:extLst>
+              <a:ext uri="{FF2B5EF4-FFF2-40B4-BE49-F238E27FC236}">
+                <a16:creationId xmlns:a16="http://schemas.microsoft.com/office/drawing/2014/main" id="{BC34CB4B-464D-826E-C399-E06977B0DA98}"/>
+              </a:ext>
+            </a:extLst>
+          </p:cNvPr>
+          <p:cNvSpPr>
+            <a:spLocks noGrp="1"/>
+          </p:cNvSpPr>
+          <p:nvPr>
+            <p:ph type="title"/>
+          </p:nvPr>
+        </p:nvSpPr>
+        <p:spPr>
+          <a:xfrm>
+            <a:off x="1356350" y="580193"/>
+            <a:ext cx="5344334" cy="880182"/>
+          </a:xfrm>
+        </p:spPr>
+        <p:txBody>
+          <a:bodyPr vert="horz" lIns="91440" tIns="45720" rIns="91440" bIns="45720" rtlCol="0" anchor="b">
+            <a:normAutofit/>
+          </a:bodyPr>
+          <a:lstStyle/>
+          <a:p>
+            <a:r>
+              <a:rPr lang="en-US" dirty="0"/>
+              <a:t>2.0 The Dashboard</a:t>
+            </a:r>
+          </a:p>
+        </p:txBody>
+      </p:sp>
+    </p:spTree>
+    <p:extLst>
+      <p:ext uri="{BB962C8B-B14F-4D97-AF65-F5344CB8AC3E}">
+        <p14:creationId xmlns:p14="http://schemas.microsoft.com/office/powerpoint/2010/main" val="4209322005"/>
+      </p:ext>
+    </p:extLst>
+  </p:cSld>
+  <p:clrMapOvr>
+    <a:masterClrMapping/>
+  </p:clrMapOvr>
+</p:sld>
+</file>
+
 <file path=ppt/slides/slide9.xml><?xml version="1.0" encoding="utf-8"?>
 <p:sld xmlns:a="http://schemas.openxmlformats.org/drawingml/2006/main" xmlns:r="http://schemas.openxmlformats.org/officeDocument/2006/relationships" xmlns:p="http://schemas.openxmlformats.org/presentationml/2006/main">
   <p:cSld>
+    <p:bg>
+      <p:bgPr>
+        <a:solidFill>
+          <a:schemeClr val="bg1"/>
+        </a:solidFill>
+        <a:effectLst/>
+      </p:bgPr>
+    </p:bg>
     <p:spTree>
       <p:nvGrpSpPr>
         <p:cNvPr id="1" name=""/>
@@ -15090,7 +15009,7 @@
           <p:cNvPr id="2" name="Title 1">
             <a:extLst>
               <a:ext uri="{FF2B5EF4-FFF2-40B4-BE49-F238E27FC236}">
-                <a16:creationId xmlns:a16="http://schemas.microsoft.com/office/drawing/2014/main" id="{5AA3460F-A84A-45A2-5A70-D69BE6DEA8DA}"/>
+                <a16:creationId xmlns:a16="http://schemas.microsoft.com/office/drawing/2014/main" id="{5B040558-A365-4CCE-92FA-5A48CD98F9C9}"/>
               </a:ext>
             </a:extLst>
           </p:cNvPr>
@@ -15103,57 +15022,208 @@
         </p:nvSpPr>
         <p:spPr>
           <a:xfrm>
-            <a:off x="539200" y="486134"/>
-            <a:ext cx="9692640" cy="1325562"/>
+            <a:off x="658260" y="586994"/>
+            <a:ext cx="3489363" cy="718870"/>
           </a:xfrm>
         </p:spPr>
         <p:txBody>
-          <a:bodyPr/>
+          <a:bodyPr>
+            <a:normAutofit fontScale="90000"/>
+          </a:bodyPr>
           <a:lstStyle/>
           <a:p>
             <a:r>
-              <a:rPr lang="en-GB" dirty="0"/>
-              <a:t>The Question:</a:t>
+              <a:rPr lang="en-US" dirty="0">
+                <a:solidFill>
+                  <a:srgbClr val="FFFEFF"/>
+                </a:solidFill>
+              </a:rPr>
+              <a:t>2.1 Data Flow</a:t>
             </a:r>
           </a:p>
         </p:txBody>
       </p:sp>
-      <p:sp>
-        <p:nvSpPr>
-          <p:cNvPr id="3" name="Content Placeholder 2">
+      <p:graphicFrame>
+        <p:nvGraphicFramePr>
+          <p:cNvPr id="4" name="Content Placeholder 3" descr="icon SmartArt graphic">
             <a:extLst>
               <a:ext uri="{FF2B5EF4-FFF2-40B4-BE49-F238E27FC236}">
-                <a16:creationId xmlns:a16="http://schemas.microsoft.com/office/drawing/2014/main" id="{796826B3-5996-AA4C-7E9E-09614B7FC030}"/>
+                <a16:creationId xmlns:a16="http://schemas.microsoft.com/office/drawing/2014/main" id="{81E592E1-99DF-4294-A2E9-EF46299BD3F4}"/>
               </a:ext>
             </a:extLst>
           </p:cNvPr>
-          <p:cNvSpPr>
-            <a:spLocks noGrp="1"/>
-          </p:cNvSpPr>
+          <p:cNvGraphicFramePr>
+            <a:graphicFrameLocks noGrp="1"/>
+          </p:cNvGraphicFramePr>
           <p:nvPr>
             <p:ph idx="1"/>
+            <p:extLst>
+              <p:ext uri="{D42A27DB-BD31-4B8C-83A1-F6EECF244321}">
+                <p14:modId xmlns:p14="http://schemas.microsoft.com/office/powerpoint/2010/main" val="392105732"/>
+              </p:ext>
+            </p:extLst>
           </p:nvPr>
+        </p:nvGraphicFramePr>
+        <p:xfrm>
+          <a:off x="3116578" y="384722"/>
+          <a:ext cx="9075422" cy="1842285"/>
+        </p:xfrm>
+        <a:graphic>
+          <a:graphicData uri="http://schemas.openxmlformats.org/drawingml/2006/diagram">
+            <dgm:relIds xmlns:dgm="http://schemas.openxmlformats.org/drawingml/2006/diagram" xmlns:r="http://schemas.openxmlformats.org/officeDocument/2006/relationships" r:dm="rId3" r:lo="rId4" r:qs="rId5" r:cs="rId6"/>
+          </a:graphicData>
+        </a:graphic>
+      </p:graphicFrame>
+      <p:sp>
+        <p:nvSpPr>
+          <p:cNvPr id="3" name="TextBox 2">
+            <a:extLst>
+              <a:ext uri="{FF2B5EF4-FFF2-40B4-BE49-F238E27FC236}">
+                <a16:creationId xmlns:a16="http://schemas.microsoft.com/office/drawing/2014/main" id="{6E5A29A0-4DB8-CD3B-6F67-070DC0A0738F}"/>
+              </a:ext>
+            </a:extLst>
+          </p:cNvPr>
+          <p:cNvSpPr txBox="1"/>
+          <p:nvPr/>
         </p:nvSpPr>
         <p:spPr>
           <a:xfrm>
-            <a:off x="539200" y="2020529"/>
-            <a:ext cx="10282575" cy="4351337"/>
+            <a:off x="761499" y="2612988"/>
+            <a:ext cx="10004824" cy="3693319"/>
           </a:xfrm>
+          <a:prstGeom prst="rect">
+            <a:avLst/>
+          </a:prstGeom>
+          <a:solidFill>
+            <a:schemeClr val="bg1"/>
+          </a:solidFill>
         </p:spPr>
         <p:txBody>
-          <a:bodyPr/>
+          <a:bodyPr wrap="square" rtlCol="0">
+            <a:spAutoFit/>
+          </a:bodyPr>
           <a:lstStyle/>
           <a:p>
             <a:r>
-              <a:rPr lang="en-GB" sz="2800" dirty="0"/>
-              <a:t>Can we extract, clean, visualise, and forecast the embedded solar generation for GSPs in the UK with sufficient accuracy to support NESO’s instructions in the BM?</a:t>
-            </a:r>
-          </a:p>
-          <a:p>
-            <a:r>
-              <a:rPr lang="en-GB" sz="2800" dirty="0"/>
-              <a:t>The purpose is to increase the operating efficiency of the network by reducing redundancy  in decision-making and create savings which flow down to UK consumers.</a:t>
-            </a:r>
+              <a:rPr lang="en-GB" dirty="0"/>
+              <a:t>The dashboard connects to two endpoints from the </a:t>
+            </a:r>
+            <a:r>
+              <a:rPr lang="en-GB" dirty="0">
+                <a:hlinkClick r:id="rId8"/>
+              </a:rPr>
+              <a:t>Sheffield Solar </a:t>
+            </a:r>
+            <a:r>
+              <a:rPr lang="en-GB" dirty="0" err="1">
+                <a:hlinkClick r:id="rId8"/>
+              </a:rPr>
+              <a:t>PVLive</a:t>
+            </a:r>
+            <a:r>
+              <a:rPr lang="en-GB" dirty="0">
+                <a:hlinkClick r:id="rId8"/>
+              </a:rPr>
+              <a:t> API </a:t>
+            </a:r>
+            <a:r>
+              <a:rPr lang="en-GB" dirty="0"/>
+              <a:t>to extract:</a:t>
+            </a:r>
+          </a:p>
+          <a:p>
+            <a:endParaRPr lang="en-GB" dirty="0"/>
+          </a:p>
+          <a:p>
+            <a:pPr marL="342900" indent="-342900">
+              <a:buFont typeface="+mj-lt"/>
+              <a:buAutoNum type="arabicPeriod"/>
+            </a:pPr>
+            <a:r>
+              <a:rPr lang="en-GB" dirty="0"/>
+              <a:t>Cumulative solar capacity (MWp), and;</a:t>
+            </a:r>
+          </a:p>
+          <a:p>
+            <a:pPr marL="342900" indent="-342900">
+              <a:buFont typeface="+mj-lt"/>
+              <a:buAutoNum type="arabicPeriod"/>
+            </a:pPr>
+            <a:r>
+              <a:rPr lang="en-GB" dirty="0"/>
+              <a:t>Historic solar generation (MWh).</a:t>
+            </a:r>
+          </a:p>
+          <a:p>
+            <a:endParaRPr lang="en-GB" dirty="0"/>
+          </a:p>
+          <a:p>
+            <a:r>
+              <a:rPr lang="en-GB" dirty="0"/>
+              <a:t>It then matches GSP IDs to their geo-locations sourced from the:</a:t>
+            </a:r>
+            <a:endParaRPr lang="en-GB" dirty="0">
+              <a:hlinkClick r:id="rId9"/>
+            </a:endParaRPr>
+          </a:p>
+          <a:p>
+            <a:pPr marL="285750" indent="-285750">
+              <a:buFont typeface="Arial" panose="020B0604020202020204" pitchFamily="34" charset="0"/>
+              <a:buChar char="•"/>
+            </a:pPr>
+            <a:r>
+              <a:rPr lang="en-GB" dirty="0">
+                <a:hlinkClick r:id="rId9"/>
+              </a:rPr>
+              <a:t>NESOs website</a:t>
+            </a:r>
+            <a:r>
+              <a:rPr lang="en-GB" dirty="0"/>
+              <a:t>,</a:t>
+            </a:r>
+          </a:p>
+          <a:p>
+            <a:r>
+              <a:rPr lang="en-GB" dirty="0"/>
+              <a:t>And, using the location of the selected GSP, pulls localised historic hourly irradiation data from:</a:t>
+            </a:r>
+          </a:p>
+          <a:p>
+            <a:pPr marL="285750" indent="-285750">
+              <a:buFont typeface="Arial" panose="020B0604020202020204" pitchFamily="34" charset="0"/>
+              <a:buChar char="•"/>
+            </a:pPr>
+            <a:r>
+              <a:rPr lang="en-GB" dirty="0">
+                <a:hlinkClick r:id="rId10"/>
+              </a:rPr>
+              <a:t>Open </a:t>
+            </a:r>
+            <a:r>
+              <a:rPr lang="en-GB" dirty="0" err="1">
+                <a:hlinkClick r:id="rId10"/>
+              </a:rPr>
+              <a:t>meteo</a:t>
+            </a:r>
+            <a:r>
+              <a:rPr lang="en-GB" dirty="0">
+                <a:hlinkClick r:id="rId10"/>
+              </a:rPr>
+              <a:t> historical weather</a:t>
+            </a:r>
+            <a:endParaRPr lang="en-GB" dirty="0"/>
+          </a:p>
+          <a:p>
+            <a:r>
+              <a:rPr lang="en-GB" dirty="0"/>
+              <a:t>then trains, fits and predicts via a machine learning model with the selected solar and weather data profiles.</a:t>
+            </a:r>
+          </a:p>
+          <a:p>
+            <a:pPr marL="285750" indent="-285750">
+              <a:buFont typeface="Arial" panose="020B0604020202020204" pitchFamily="34" charset="0"/>
+              <a:buChar char="•"/>
+            </a:pPr>
             <a:endParaRPr lang="en-GB" dirty="0"/>
           </a:p>
         </p:txBody>
@@ -15161,7 +15231,7 @@
     </p:spTree>
     <p:extLst>
       <p:ext uri="{BB962C8B-B14F-4D97-AF65-F5344CB8AC3E}">
-        <p14:creationId xmlns:p14="http://schemas.microsoft.com/office/powerpoint/2010/main" val="3240610859"/>
+        <p14:creationId xmlns:p14="http://schemas.microsoft.com/office/powerpoint/2010/main" val="1703342593"/>
       </p:ext>
     </p:extLst>
   </p:cSld>

</xml_diff>